<commit_message>
Deleted old RMSE plots
</commit_message>
<xml_diff>
--- a/FixedWingDoublet/Figures and data for presentation/EKP Correction.pptx
+++ b/FixedWingDoublet/Figures and data for presentation/EKP Correction.pptx
@@ -117,7 +117,7 @@
 <file path=ppt/revisionInfo.xml><?xml version="1.0" encoding="utf-8"?>
 <p1510:revInfo xmlns:a="http://schemas.openxmlformats.org/drawingml/2006/main" xmlns:r="http://schemas.openxmlformats.org/officeDocument/2006/relationships" xmlns:p1510="http://schemas.microsoft.com/office/powerpoint/2015/10/main">
   <p1510:revLst>
-    <p1510:client id="{80EAD2B4-3070-4D4F-AC83-B79623217CA9}" v="1" dt="2024-02-21T18:14:30.123"/>
+    <p1510:client id="{80EAD2B4-3070-4D4F-AC83-B79623217CA9}" v="3" dt="2024-02-22T19:17:51.863"/>
   </p1510:revLst>
 </p1510:revInfo>
 </file>
@@ -126,8 +126,8 @@
 <pc:chgInfo xmlns:a="http://schemas.openxmlformats.org/drawingml/2006/main" xmlns:r="http://schemas.openxmlformats.org/officeDocument/2006/relationships" xmlns:ac="http://schemas.microsoft.com/office/drawing/2013/main/command" xmlns:pc="http://schemas.microsoft.com/office/powerpoint/2013/main/command">
   <pc:docChgLst>
     <pc:chgData name="Sakib, Nazmus" userId="5a70df67-f8b8-44b4-9e1e-b1bbee6ba8e9" providerId="ADAL" clId="{80EAD2B4-3070-4D4F-AC83-B79623217CA9}"/>
-    <pc:docChg chg="custSel addSld modSld">
-      <pc:chgData name="Sakib, Nazmus" userId="5a70df67-f8b8-44b4-9e1e-b1bbee6ba8e9" providerId="ADAL" clId="{80EAD2B4-3070-4D4F-AC83-B79623217CA9}" dt="2024-02-21T18:14:31.714" v="4" actId="1076"/>
+    <pc:docChg chg="custSel addSld delSld modSld">
+      <pc:chgData name="Sakib, Nazmus" userId="5a70df67-f8b8-44b4-9e1e-b1bbee6ba8e9" providerId="ADAL" clId="{80EAD2B4-3070-4D4F-AC83-B79623217CA9}" dt="2024-02-22T20:03:16.776" v="21" actId="47"/>
       <pc:docMkLst>
         <pc:docMk/>
       </pc:docMkLst>
@@ -175,6 +175,45 @@
             <pc:docMk/>
             <pc:sldMk cId="954715612" sldId="258"/>
             <ac:picMk id="13" creationId="{B3DF920D-0DD0-C10E-2ADE-3329616B2D53}"/>
+          </ac:picMkLst>
+        </pc:picChg>
+      </pc:sldChg>
+      <pc:sldChg chg="addSp delSp modSp new del mod">
+        <pc:chgData name="Sakib, Nazmus" userId="5a70df67-f8b8-44b4-9e1e-b1bbee6ba8e9" providerId="ADAL" clId="{80EAD2B4-3070-4D4F-AC83-B79623217CA9}" dt="2024-02-22T20:03:16.776" v="21" actId="47"/>
+        <pc:sldMkLst>
+          <pc:docMk/>
+          <pc:sldMk cId="1858827939" sldId="259"/>
+        </pc:sldMkLst>
+        <pc:spChg chg="del">
+          <ac:chgData name="Sakib, Nazmus" userId="5a70df67-f8b8-44b4-9e1e-b1bbee6ba8e9" providerId="ADAL" clId="{80EAD2B4-3070-4D4F-AC83-B79623217CA9}" dt="2024-02-22T19:16:36.321" v="6" actId="478"/>
+          <ac:spMkLst>
+            <pc:docMk/>
+            <pc:sldMk cId="1858827939" sldId="259"/>
+            <ac:spMk id="2" creationId="{070C2896-9FDD-6387-B29D-02220B0D437C}"/>
+          </ac:spMkLst>
+        </pc:spChg>
+        <pc:spChg chg="del">
+          <ac:chgData name="Sakib, Nazmus" userId="5a70df67-f8b8-44b4-9e1e-b1bbee6ba8e9" providerId="ADAL" clId="{80EAD2B4-3070-4D4F-AC83-B79623217CA9}" dt="2024-02-22T19:16:37.298" v="7" actId="478"/>
+          <ac:spMkLst>
+            <pc:docMk/>
+            <pc:sldMk cId="1858827939" sldId="259"/>
+            <ac:spMk id="3" creationId="{36050B4E-1BCB-516A-4483-2F8894E624FB}"/>
+          </ac:spMkLst>
+        </pc:spChg>
+        <pc:picChg chg="add mod modCrop">
+          <ac:chgData name="Sakib, Nazmus" userId="5a70df67-f8b8-44b4-9e1e-b1bbee6ba8e9" providerId="ADAL" clId="{80EAD2B4-3070-4D4F-AC83-B79623217CA9}" dt="2024-02-22T19:17:51.019" v="13" actId="1076"/>
+          <ac:picMkLst>
+            <pc:docMk/>
+            <pc:sldMk cId="1858827939" sldId="259"/>
+            <ac:picMk id="5" creationId="{DFDC1960-EB82-D6A3-1B6A-346561757AF7}"/>
+          </ac:picMkLst>
+        </pc:picChg>
+        <pc:picChg chg="add mod modCrop">
+          <ac:chgData name="Sakib, Nazmus" userId="5a70df67-f8b8-44b4-9e1e-b1bbee6ba8e9" providerId="ADAL" clId="{80EAD2B4-3070-4D4F-AC83-B79623217CA9}" dt="2024-02-22T19:19:13.867" v="20" actId="1076"/>
+          <ac:picMkLst>
+            <pc:docMk/>
+            <pc:sldMk cId="1858827939" sldId="259"/>
+            <ac:picMk id="6" creationId="{949F3104-4839-D43F-2264-0BF80F7F5585}"/>
           </ac:picMkLst>
         </pc:picChg>
       </pc:sldChg>
@@ -330,7 +369,7 @@
           <a:p>
             <a:fld id="{4AF23A85-C92D-446E-8C00-3DD7023856C5}" type="datetimeFigureOut">
               <a:rPr lang="en-US" smtClean="0"/>
-              <a:t>2/21/2024</a:t>
+              <a:t>2/22/2024</a:t>
             </a:fld>
             <a:endParaRPr lang="en-US"/>
           </a:p>
@@ -528,7 +567,7 @@
           <a:p>
             <a:fld id="{4AF23A85-C92D-446E-8C00-3DD7023856C5}" type="datetimeFigureOut">
               <a:rPr lang="en-US" smtClean="0"/>
-              <a:t>2/21/2024</a:t>
+              <a:t>2/22/2024</a:t>
             </a:fld>
             <a:endParaRPr lang="en-US"/>
           </a:p>
@@ -736,7 +775,7 @@
           <a:p>
             <a:fld id="{4AF23A85-C92D-446E-8C00-3DD7023856C5}" type="datetimeFigureOut">
               <a:rPr lang="en-US" smtClean="0"/>
-              <a:t>2/21/2024</a:t>
+              <a:t>2/22/2024</a:t>
             </a:fld>
             <a:endParaRPr lang="en-US"/>
           </a:p>
@@ -934,7 +973,7 @@
           <a:p>
             <a:fld id="{4AF23A85-C92D-446E-8C00-3DD7023856C5}" type="datetimeFigureOut">
               <a:rPr lang="en-US" smtClean="0"/>
-              <a:t>2/21/2024</a:t>
+              <a:t>2/22/2024</a:t>
             </a:fld>
             <a:endParaRPr lang="en-US"/>
           </a:p>
@@ -1209,7 +1248,7 @@
           <a:p>
             <a:fld id="{4AF23A85-C92D-446E-8C00-3DD7023856C5}" type="datetimeFigureOut">
               <a:rPr lang="en-US" smtClean="0"/>
-              <a:t>2/21/2024</a:t>
+              <a:t>2/22/2024</a:t>
             </a:fld>
             <a:endParaRPr lang="en-US"/>
           </a:p>
@@ -1474,7 +1513,7 @@
           <a:p>
             <a:fld id="{4AF23A85-C92D-446E-8C00-3DD7023856C5}" type="datetimeFigureOut">
               <a:rPr lang="en-US" smtClean="0"/>
-              <a:t>2/21/2024</a:t>
+              <a:t>2/22/2024</a:t>
             </a:fld>
             <a:endParaRPr lang="en-US"/>
           </a:p>
@@ -1886,7 +1925,7 @@
           <a:p>
             <a:fld id="{4AF23A85-C92D-446E-8C00-3DD7023856C5}" type="datetimeFigureOut">
               <a:rPr lang="en-US" smtClean="0"/>
-              <a:t>2/21/2024</a:t>
+              <a:t>2/22/2024</a:t>
             </a:fld>
             <a:endParaRPr lang="en-US"/>
           </a:p>
@@ -2027,7 +2066,7 @@
           <a:p>
             <a:fld id="{4AF23A85-C92D-446E-8C00-3DD7023856C5}" type="datetimeFigureOut">
               <a:rPr lang="en-US" smtClean="0"/>
-              <a:t>2/21/2024</a:t>
+              <a:t>2/22/2024</a:t>
             </a:fld>
             <a:endParaRPr lang="en-US"/>
           </a:p>
@@ -2140,7 +2179,7 @@
           <a:p>
             <a:fld id="{4AF23A85-C92D-446E-8C00-3DD7023856C5}" type="datetimeFigureOut">
               <a:rPr lang="en-US" smtClean="0"/>
-              <a:t>2/21/2024</a:t>
+              <a:t>2/22/2024</a:t>
             </a:fld>
             <a:endParaRPr lang="en-US"/>
           </a:p>
@@ -2451,7 +2490,7 @@
           <a:p>
             <a:fld id="{4AF23A85-C92D-446E-8C00-3DD7023856C5}" type="datetimeFigureOut">
               <a:rPr lang="en-US" smtClean="0"/>
-              <a:t>2/21/2024</a:t>
+              <a:t>2/22/2024</a:t>
             </a:fld>
             <a:endParaRPr lang="en-US"/>
           </a:p>
@@ -2739,7 +2778,7 @@
           <a:p>
             <a:fld id="{4AF23A85-C92D-446E-8C00-3DD7023856C5}" type="datetimeFigureOut">
               <a:rPr lang="en-US" smtClean="0"/>
-              <a:t>2/21/2024</a:t>
+              <a:t>2/22/2024</a:t>
             </a:fld>
             <a:endParaRPr lang="en-US"/>
           </a:p>
@@ -2980,7 +3019,7 @@
           <a:p>
             <a:fld id="{4AF23A85-C92D-446E-8C00-3DD7023856C5}" type="datetimeFigureOut">
               <a:rPr lang="en-US" smtClean="0"/>
-              <a:t>2/21/2024</a:t>
+              <a:t>2/22/2024</a:t>
             </a:fld>
             <a:endParaRPr lang="en-US"/>
           </a:p>

</xml_diff>